<commit_message>
Updated the Powerpoint slides to include participants
</commit_message>
<xml_diff>
--- a/VAT_Presentation_Slides.pptx
+++ b/VAT_Presentation_Slides.pptx
@@ -1,20 +1,21 @@
 
 <file path=ppt/presentation.xml><?xml version="1.0" encoding="utf-8"?>
-<p:presentation xmlns:a="http://schemas.openxmlformats.org/drawingml/2006/main" xmlns:r="http://schemas.openxmlformats.org/officeDocument/2006/relationships" xmlns:p="http://schemas.openxmlformats.org/presentationml/2006/main" removePersonalInfoOnSave="1" saveSubsetFonts="1" autoCompressPictures="0">
+<p:presentation xmlns:a="http://schemas.openxmlformats.org/drawingml/2006/main" xmlns:r="http://schemas.openxmlformats.org/officeDocument/2006/relationships" xmlns:p="http://schemas.openxmlformats.org/presentationml/2006/main" saveSubsetFonts="1" autoCompressPictures="0">
   <p:sldMasterIdLst>
     <p:sldMasterId id="2147483648" r:id="rId4"/>
   </p:sldMasterIdLst>
   <p:notesMasterIdLst>
-    <p:notesMasterId r:id="rId12"/>
+    <p:notesMasterId r:id="rId13"/>
   </p:notesMasterIdLst>
   <p:sldIdLst>
     <p:sldId id="530" r:id="rId5"/>
-    <p:sldId id="547" r:id="rId6"/>
-    <p:sldId id="548" r:id="rId7"/>
-    <p:sldId id="549" r:id="rId8"/>
-    <p:sldId id="550" r:id="rId9"/>
-    <p:sldId id="551" r:id="rId10"/>
-    <p:sldId id="552" r:id="rId11"/>
+    <p:sldId id="556" r:id="rId6"/>
+    <p:sldId id="547" r:id="rId7"/>
+    <p:sldId id="548" r:id="rId8"/>
+    <p:sldId id="549" r:id="rId9"/>
+    <p:sldId id="550" r:id="rId10"/>
+    <p:sldId id="551" r:id="rId11"/>
+    <p:sldId id="552" r:id="rId12"/>
   </p:sldIdLst>
   <p:sldSz cx="12192000" cy="6858000"/>
   <p:notesSz cx="6858000" cy="9144000"/>
@@ -215,7 +216,7 @@
           <a:p>
             <a:fld id="{3F00BCFC-AFFD-334C-A183-6116BAFDF92B}" type="datetimeFigureOut">
               <a:rPr lang="en-US" smtClean="0"/>
-              <a:t>4/1/2025</a:t>
+              <a:t>4/2/2025</a:t>
             </a:fld>
             <a:endParaRPr lang="en-US" dirty="0"/>
           </a:p>
@@ -17084,7 +17085,13 @@
   <p:cSld>
     <p:spTree>
       <p:nvGrpSpPr>
-        <p:cNvPr id="1" name=""/>
+        <p:cNvPr id="1" name="">
+          <a:extLst>
+            <a:ext uri="{FF2B5EF4-FFF2-40B4-BE49-F238E27FC236}">
+              <a16:creationId xmlns:a16="http://schemas.microsoft.com/office/drawing/2014/main" id="{1DC095B9-7A92-C9CD-07DE-D9E72C28F318}"/>
+            </a:ext>
+          </a:extLst>
+        </p:cNvPr>
         <p:cNvGrpSpPr/>
         <p:nvPr/>
       </p:nvGrpSpPr>
@@ -17098,7 +17105,13 @@
       </p:grpSpPr>
       <p:sp>
         <p:nvSpPr>
-          <p:cNvPr id="2" name="Title 1"/>
+          <p:cNvPr id="2" name="Title 1">
+            <a:extLst>
+              <a:ext uri="{FF2B5EF4-FFF2-40B4-BE49-F238E27FC236}">
+                <a16:creationId xmlns:a16="http://schemas.microsoft.com/office/drawing/2014/main" id="{4E3EE769-6946-08A1-6A3A-DD54872CB220}"/>
+              </a:ext>
+            </a:extLst>
+          </p:cNvPr>
           <p:cNvSpPr>
             <a:spLocks noGrp="1"/>
           </p:cNvSpPr>
@@ -17112,47 +17125,66 @@
           <a:lstStyle/>
           <a:p>
             <a:r>
-              <a:rPr sz="3600" dirty="0"/>
-              <a:t>What is VAT?</a:t>
+              <a:rPr lang="en-US" sz="3600" dirty="0"/>
+              <a:t>Members Involved in the Project</a:t>
             </a:r>
-          </a:p>
-        </p:txBody>
-      </p:sp>
-      <p:sp>
-        <p:nvSpPr>
-          <p:cNvPr id="3" name="Content Placeholder 2"/>
-          <p:cNvSpPr>
-            <a:spLocks noGrp="1"/>
-          </p:cNvSpPr>
-          <p:nvPr>
-            <p:ph idx="1"/>
-          </p:nvPr>
-        </p:nvSpPr>
-        <p:spPr/>
-        <p:txBody>
-          <a:bodyPr/>
-          <a:lstStyle/>
-          <a:p>
-            <a:r>
-              <a:rPr dirty="0"/>
-              <a:t>VAT (Visual Assessment of Tendency) is a tool to determine whether clusters exist in your data before applying clustering algorithms.</a:t>
-            </a:r>
-          </a:p>
-          <a:p>
-            <a:r>
-              <a:rPr dirty="0"/>
-              <a:t>It visually presents reordered pairwise dissimilarity values as a grayscale image.</a:t>
-            </a:r>
-          </a:p>
-          <a:p>
-            <a:r>
-              <a:rPr dirty="0"/>
-              <a:t>Dark blocks along the diagonal of the image often indicate cluster presence.</a:t>
-            </a:r>
-          </a:p>
-        </p:txBody>
-      </p:sp>
+            <a:endParaRPr sz="3600" dirty="0"/>
+          </a:p>
+        </p:txBody>
+      </p:sp>
+      <p:pic>
+        <p:nvPicPr>
+          <p:cNvPr id="4" name="Picture 2">
+            <a:extLst>
+              <a:ext uri="{FF2B5EF4-FFF2-40B4-BE49-F238E27FC236}">
+                <a16:creationId xmlns:a16="http://schemas.microsoft.com/office/drawing/2014/main" id="{820F5679-A2D6-3E88-1F4A-E08A5FB0D98C}"/>
+              </a:ext>
+            </a:extLst>
+          </p:cNvPr>
+          <p:cNvPicPr>
+            <a:picLocks noChangeAspect="1" noChangeArrowheads="1"/>
+          </p:cNvPicPr>
+          <p:nvPr/>
+        </p:nvPicPr>
+        <p:blipFill>
+          <a:blip r:embed="rId2">
+            <a:extLst>
+              <a:ext uri="{28A0092B-C50C-407E-A947-70E740481C1C}">
+                <a14:useLocalDpi xmlns:a14="http://schemas.microsoft.com/office/drawing/2010/main" val="0"/>
+              </a:ext>
+            </a:extLst>
+          </a:blip>
+          <a:srcRect/>
+          <a:stretch>
+            <a:fillRect/>
+          </a:stretch>
+        </p:blipFill>
+        <p:spPr bwMode="auto">
+          <a:xfrm>
+            <a:off x="1718734" y="2260071"/>
+            <a:ext cx="7620000" cy="3590925"/>
+          </a:xfrm>
+          <a:prstGeom prst="rect">
+            <a:avLst/>
+          </a:prstGeom>
+          <a:noFill/>
+          <a:extLst>
+            <a:ext uri="{909E8E84-426E-40DD-AFC4-6F175D3DCCD1}">
+              <a14:hiddenFill xmlns:a14="http://schemas.microsoft.com/office/drawing/2010/main">
+                <a:solidFill>
+                  <a:srgbClr val="FFFFFF"/>
+                </a:solidFill>
+              </a14:hiddenFill>
+            </a:ext>
+          </a:extLst>
+        </p:spPr>
+      </p:pic>
     </p:spTree>
+    <p:extLst>
+      <p:ext uri="{BB962C8B-B14F-4D97-AF65-F5344CB8AC3E}">
+        <p14:creationId xmlns:p14="http://schemas.microsoft.com/office/powerpoint/2010/main" val="4140715866"/>
+      </p:ext>
+    </p:extLst>
   </p:cSld>
   <p:clrMapOvr>
     <a:masterClrMapping/>
@@ -17194,7 +17226,7 @@
           <a:p>
             <a:r>
               <a:rPr sz="3600" dirty="0"/>
-              <a:t>Why Use VAT?</a:t>
+              <a:t>What is VAT?</a:t>
             </a:r>
           </a:p>
         </p:txBody>
@@ -17216,19 +17248,19 @@
           <a:p>
             <a:r>
               <a:rPr dirty="0"/>
-              <a:t>Many clustering algorithms will find clusters even if there are none.</a:t>
+              <a:t>VAT (Visual Assessment of Tendency) is a tool to determine whether clusters exist in your data before applying clustering algorithms.</a:t>
             </a:r>
           </a:p>
           <a:p>
             <a:r>
               <a:rPr dirty="0"/>
-              <a:t>VAT helps visually assess whether real structure exists in the data.</a:t>
+              <a:t>It visually presents reordered pairwise dissimilarity values as a grayscale image.</a:t>
             </a:r>
           </a:p>
           <a:p>
             <a:r>
               <a:rPr dirty="0"/>
-              <a:t>It works for both object data (vectors) and relational data (distance matrices), even when data is incomplete.</a:t>
+              <a:t>Dark blocks along the diagonal of the image often indicate cluster presence.</a:t>
             </a:r>
           </a:p>
         </p:txBody>
@@ -17275,7 +17307,7 @@
           <a:p>
             <a:r>
               <a:rPr sz="3600" dirty="0"/>
-              <a:t>How VAT Works – Step by Step</a:t>
+              <a:t>Why Use VAT?</a:t>
             </a:r>
           </a:p>
         </p:txBody>
@@ -17290,31 +17322,26 @@
             <p:ph idx="1"/>
           </p:nvPr>
         </p:nvSpPr>
-        <p:spPr>
-          <a:xfrm>
-            <a:off x="1536192" y="2212847"/>
-            <a:ext cx="6422136" cy="4077885"/>
-          </a:xfrm>
-        </p:spPr>
+        <p:spPr/>
         <p:txBody>
           <a:bodyPr/>
           <a:lstStyle/>
           <a:p>
             <a:r>
-              <a:rPr sz="2000" dirty="0"/>
-              <a:t>Compute a pairwise dissimilarity matrix using a chosen distance metric (e.g., Euclidean distance).</a:t>
+              <a:rPr dirty="0"/>
+              <a:t>Many clustering algorithms will find clusters even if there are none.</a:t>
             </a:r>
           </a:p>
           <a:p>
             <a:r>
-              <a:rPr sz="2000" dirty="0"/>
-              <a:t>Reorder the matrix so that similar points appear close together, using a method inspired by Prim’s MST algorithm.</a:t>
+              <a:rPr dirty="0"/>
+              <a:t>VAT helps visually assess whether real structure exists in the data.</a:t>
             </a:r>
           </a:p>
           <a:p>
             <a:r>
-              <a:rPr sz="2000" dirty="0"/>
-              <a:t>Display the reordered matrix as an image where intensity represents distance (black = similar, white = dissimilar).</a:t>
+              <a:rPr dirty="0"/>
+              <a:t>It works for both object data (vectors) and relational data (distance matrices), even when data is incomplete.</a:t>
             </a:r>
           </a:p>
         </p:txBody>
@@ -17361,7 +17388,7 @@
           <a:p>
             <a:r>
               <a:rPr sz="3600" dirty="0"/>
-              <a:t>Interpreting the VAT Image</a:t>
+              <a:t>How VAT Works – Step by Step</a:t>
             </a:r>
           </a:p>
         </p:txBody>
@@ -17376,26 +17403,31 @@
             <p:ph idx="1"/>
           </p:nvPr>
         </p:nvSpPr>
-        <p:spPr/>
+        <p:spPr>
+          <a:xfrm>
+            <a:off x="1536192" y="2212847"/>
+            <a:ext cx="6422136" cy="4077885"/>
+          </a:xfrm>
+        </p:spPr>
         <p:txBody>
           <a:bodyPr/>
           <a:lstStyle/>
           <a:p>
             <a:r>
               <a:rPr sz="2000" dirty="0"/>
-              <a:t>Well-defined clusters appear as dark blocks aligned along the diagonal of the image.</a:t>
+              <a:t>Compute a pairwise dissimilarity matrix using a chosen distance metric (e.g., Euclidean distance).</a:t>
             </a:r>
           </a:p>
           <a:p>
             <a:r>
               <a:rPr sz="2000" dirty="0"/>
-              <a:t>Absence of blocks or random patterns indicates no cluster structure.</a:t>
+              <a:t>Reorder the matrix so that similar points appear close together, using a method inspired by Prim’s MST algorithm.</a:t>
             </a:r>
           </a:p>
           <a:p>
             <a:r>
               <a:rPr sz="2000" dirty="0"/>
-              <a:t>The VAT image provides a quick, intuitive way to assess the potential for clustering.</a:t>
+              <a:t>Display the reordered matrix as an image where intensity represents distance (black = similar, white = dissimilar).</a:t>
             </a:r>
           </a:p>
         </p:txBody>
@@ -17442,7 +17474,7 @@
           <a:p>
             <a:r>
               <a:rPr sz="3600" dirty="0"/>
-              <a:t>Examples from the VAT Paper</a:t>
+              <a:t>Interpreting the VAT Image</a:t>
             </a:r>
           </a:p>
         </p:txBody>
@@ -17464,25 +17496,19 @@
           <a:p>
             <a:r>
               <a:rPr sz="2000" dirty="0"/>
-              <a:t>Normal(4), Normal(3): VAT reveals clear clusters via distinct diagonal blocks.</a:t>
+              <a:t>Well-defined clusters appear as dark blocks aligned along the diagonal of the image.</a:t>
             </a:r>
           </a:p>
           <a:p>
             <a:r>
               <a:rPr sz="2000" dirty="0"/>
-              <a:t>Normal(2), Normal(1): Cluster blocks become fuzzier as separation decreases.</a:t>
+              <a:t>Absence of blocks or random patterns indicates no cluster structure.</a:t>
             </a:r>
           </a:p>
           <a:p>
             <a:r>
               <a:rPr sz="2000" dirty="0"/>
-              <a:t>Normal(0): Appears random – no natural clusters exist.</a:t>
-            </a:r>
-          </a:p>
-          <a:p>
-            <a:r>
-              <a:rPr sz="2000" dirty="0"/>
-              <a:t>IRIS dataset: VAT confirms 2 strong clusters despite 3 class labels.</a:t>
+              <a:t>The VAT image provides a quick, intuitive way to assess the potential for clustering.</a:t>
             </a:r>
           </a:p>
         </p:txBody>
@@ -17496,6 +17522,93 @@
 </file>
 
 <file path=ppt/slides/slide7.xml><?xml version="1.0" encoding="utf-8"?>
+<p:sld xmlns:a="http://schemas.openxmlformats.org/drawingml/2006/main" xmlns:r="http://schemas.openxmlformats.org/officeDocument/2006/relationships" xmlns:p="http://schemas.openxmlformats.org/presentationml/2006/main">
+  <p:cSld>
+    <p:spTree>
+      <p:nvGrpSpPr>
+        <p:cNvPr id="1" name=""/>
+        <p:cNvGrpSpPr/>
+        <p:nvPr/>
+      </p:nvGrpSpPr>
+      <p:grpSpPr>
+        <a:xfrm>
+          <a:off x="0" y="0"/>
+          <a:ext cx="0" cy="0"/>
+          <a:chOff x="0" y="0"/>
+          <a:chExt cx="0" cy="0"/>
+        </a:xfrm>
+      </p:grpSpPr>
+      <p:sp>
+        <p:nvSpPr>
+          <p:cNvPr id="2" name="Title 1"/>
+          <p:cNvSpPr>
+            <a:spLocks noGrp="1"/>
+          </p:cNvSpPr>
+          <p:nvPr>
+            <p:ph type="title"/>
+          </p:nvPr>
+        </p:nvSpPr>
+        <p:spPr/>
+        <p:txBody>
+          <a:bodyPr/>
+          <a:lstStyle/>
+          <a:p>
+            <a:r>
+              <a:rPr sz="3600" dirty="0"/>
+              <a:t>Examples from the VAT Paper</a:t>
+            </a:r>
+          </a:p>
+        </p:txBody>
+      </p:sp>
+      <p:sp>
+        <p:nvSpPr>
+          <p:cNvPr id="3" name="Content Placeholder 2"/>
+          <p:cNvSpPr>
+            <a:spLocks noGrp="1"/>
+          </p:cNvSpPr>
+          <p:nvPr>
+            <p:ph idx="1"/>
+          </p:nvPr>
+        </p:nvSpPr>
+        <p:spPr/>
+        <p:txBody>
+          <a:bodyPr/>
+          <a:lstStyle/>
+          <a:p>
+            <a:r>
+              <a:rPr sz="2000" dirty="0"/>
+              <a:t>Normal(4), Normal(3): VAT reveals clear clusters via distinct diagonal blocks.</a:t>
+            </a:r>
+          </a:p>
+          <a:p>
+            <a:r>
+              <a:rPr sz="2000" dirty="0"/>
+              <a:t>Normal(2), Normal(1): Cluster blocks become fuzzier as separation decreases.</a:t>
+            </a:r>
+          </a:p>
+          <a:p>
+            <a:r>
+              <a:rPr sz="2000" dirty="0"/>
+              <a:t>Normal(0): Appears random – no natural clusters exist.</a:t>
+            </a:r>
+          </a:p>
+          <a:p>
+            <a:r>
+              <a:rPr sz="2000" dirty="0"/>
+              <a:t>IRIS dataset: VAT confirms 2 strong clusters despite 3 class labels.</a:t>
+            </a:r>
+          </a:p>
+        </p:txBody>
+      </p:sp>
+    </p:spTree>
+  </p:cSld>
+  <p:clrMapOvr>
+    <a:masterClrMapping/>
+  </p:clrMapOvr>
+</p:sld>
+</file>
+
+<file path=ppt/slides/slide8.xml><?xml version="1.0" encoding="utf-8"?>
 <p:sld xmlns:a="http://schemas.openxmlformats.org/drawingml/2006/main" xmlns:r="http://schemas.openxmlformats.org/officeDocument/2006/relationships" xmlns:p="http://schemas.openxmlformats.org/presentationml/2006/main">
   <p:cSld>
     <p:spTree>
@@ -18084,15 +18197,6 @@
 </file>
 
 <file path=customXml/item1.xml><?xml version="1.0" encoding="utf-8"?>
-<?mso-contentType ?>
-<FormTemplates xmlns="http://schemas.microsoft.com/sharepoint/v3/contenttype/forms">
-  <Display>DocumentLibraryForm</Display>
-  <Edit>DocumentLibraryForm</Edit>
-  <New>DocumentLibraryForm</New>
-</FormTemplates>
-</file>
-
-<file path=customXml/item2.xml><?xml version="1.0" encoding="utf-8"?>
 <ct:contentTypeSchema xmlns:ct="http://schemas.microsoft.com/office/2006/metadata/contentType" xmlns:ma="http://schemas.microsoft.com/office/2006/metadata/properties/metaAttributes" ct:_="" ma:_="" ma:contentTypeName="Document" ma:contentTypeID="0x01010079F111ED35F8CC479449609E8A0923A6" ma:contentTypeVersion="25" ma:contentTypeDescription="Create a new document." ma:contentTypeScope="" ma:versionID="e02306daf00165b375dc6a58966960be">
   <xsd:schema xmlns:xsd="http://www.w3.org/2001/XMLSchema" xmlns:xs="http://www.w3.org/2001/XMLSchema" xmlns:p="http://schemas.microsoft.com/office/2006/metadata/properties" xmlns:ns1="http://schemas.microsoft.com/sharepoint/v3" xmlns:ns2="71af3243-3dd4-4a8d-8c0d-dd76da1f02a5" xmlns:ns3="16c05727-aa75-4e4a-9b5f-8a80a1165891" xmlns:ns4="230e9df3-be65-4c73-a93b-d1236ebd677e" targetNamespace="http://schemas.microsoft.com/office/2006/metadata/properties" ma:root="true" ma:fieldsID="df88fb76bf5f555224557953949c1ec9" ns1:_="" ns2:_="" ns3:_="" ns4:_="">
     <xsd:import namespace="http://schemas.microsoft.com/sharepoint/v3"/>
@@ -18386,6 +18490,15 @@
 </ct:contentTypeSchema>
 </file>
 
+<file path=customXml/item2.xml><?xml version="1.0" encoding="utf-8"?>
+<?mso-contentType ?>
+<FormTemplates xmlns="http://schemas.microsoft.com/sharepoint/v3/contenttype/forms">
+  <Display>DocumentLibraryForm</Display>
+  <Edit>DocumentLibraryForm</Edit>
+  <New>DocumentLibraryForm</New>
+</FormTemplates>
+</file>
+
 <file path=customXml/item3.xml><?xml version="1.0" encoding="utf-8"?>
 <p:properties xmlns:p="http://schemas.microsoft.com/office/2006/metadata/properties" xmlns:xsi="http://www.w3.org/2001/XMLSchema-instance" xmlns:pc="http://schemas.microsoft.com/office/infopath/2007/PartnerControls">
   <documentManagement>
@@ -18407,14 +18520,6 @@
 </file>
 
 <file path=customXml/itemProps1.xml><?xml version="1.0" encoding="utf-8"?>
-<ds:datastoreItem xmlns:ds="http://schemas.openxmlformats.org/officeDocument/2006/customXml" ds:itemID="{43C4A95C-9007-4EA6-944B-306B6F2A0100}">
-  <ds:schemaRefs>
-    <ds:schemaRef ds:uri="http://schemas.microsoft.com/sharepoint/v3/contenttype/forms"/>
-  </ds:schemaRefs>
-</ds:datastoreItem>
-</file>
-
-<file path=customXml/itemProps2.xml><?xml version="1.0" encoding="utf-8"?>
 <ds:datastoreItem xmlns:ds="http://schemas.openxmlformats.org/officeDocument/2006/customXml" ds:itemID="{62CF8670-35D1-4455-AC7A-762B7388BE22}">
   <ds:schemaRefs>
     <ds:schemaRef ds:uri="http://schemas.microsoft.com/office/2006/metadata/contentType"/>
@@ -18435,6 +18540,14 @@
 </ds:datastoreItem>
 </file>
 
+<file path=customXml/itemProps2.xml><?xml version="1.0" encoding="utf-8"?>
+<ds:datastoreItem xmlns:ds="http://schemas.openxmlformats.org/officeDocument/2006/customXml" ds:itemID="{43C4A95C-9007-4EA6-944B-306B6F2A0100}">
+  <ds:schemaRefs>
+    <ds:schemaRef ds:uri="http://schemas.microsoft.com/sharepoint/v3/contenttype/forms"/>
+  </ds:schemaRefs>
+</ds:datastoreItem>
+</file>
+
 <file path=customXml/itemProps3.xml><?xml version="1.0" encoding="utf-8"?>
 <ds:datastoreItem xmlns:ds="http://schemas.openxmlformats.org/officeDocument/2006/customXml" ds:itemID="{EA4A3FD6-E6BF-490E-B6B4-6A011394B0EB}">
   <ds:schemaRefs>

</xml_diff>